<commit_message>
Made minor tweaks to slide deck.
</commit_message>
<xml_diff>
--- a/presos/LincolnHighVisit-2023.pptx
+++ b/presos/LincolnHighVisit-2023.pptx
@@ -235,7 +235,7 @@
           <a:p>
             <a:fld id="{6876BBC0-2D69-4443-A62A-A79B2D6915DC}" type="datetimeFigureOut">
               <a:rPr lang="en-US" smtClean="0"/>
-              <a:t>4/11/23</a:t>
+              <a:t>4/13/23</a:t>
             </a:fld>
             <a:endParaRPr lang="en-US"/>
           </a:p>
@@ -7028,7 +7028,7 @@
           <a:p>
             <a:fld id="{4509A250-FF31-4206-8172-F9D3106AACB1}" type="datetimeFigureOut">
               <a:rPr lang="en-US" smtClean="0"/>
-              <a:t>4/11/23</a:t>
+              <a:t>4/13/23</a:t>
             </a:fld>
             <a:endParaRPr lang="en-US" dirty="0"/>
           </a:p>
@@ -11092,7 +11092,7 @@
                   <a:srgbClr val="0071C5"/>
                 </a:solidFill>
               </a:rPr>
-              <a:t>Because the public key is “public,” the public exponent is a known value.  It usually is 3 or 65,537.</a:t>
+              <a:t>Because the public key is “public,” the public exponent is a known value.  It usually is 3, 17, or 65,537.</a:t>
             </a:r>
           </a:p>
           <a:p>
@@ -11428,7 +11428,7 @@
             </a:pPr>
             <a:r>
               <a:rPr lang="en-US" dirty="0"/>
-              <a:t>i.e. Quadratic sieve, general number field sieve, Shor’s algorithm (quantum computers)</a:t>
+              <a:t>i.e., Quadratic sieve, general number field sieve, Shor’s algorithm (quantum computers)</a:t>
             </a:r>
           </a:p>
         </p:txBody>
@@ -12661,8 +12661,8 @@
         </p:nvSpPr>
         <p:spPr>
           <a:xfrm>
-            <a:off x="607484" y="1576298"/>
-            <a:ext cx="10970683" cy="4567767"/>
+            <a:off x="609601" y="1337414"/>
+            <a:ext cx="10970683" cy="1828800"/>
           </a:xfrm>
         </p:spPr>
         <p:txBody>
@@ -12681,20 +12681,479 @@
             <a:pPr algn="ctr"/>
             <a:r>
               <a:rPr lang="en-US" dirty="0"/>
-              <a:t>3 x 10^2 + 4 x 10^1 + 2 x 10^0</a:t>
-            </a:r>
+              <a:t>(3 x 10</a:t>
+            </a:r>
+            <a:r>
+              <a:rPr lang="en-US" baseline="30000" dirty="0"/>
+              <a:t>2</a:t>
+            </a:r>
+            <a:r>
+              <a:rPr lang="en-US" dirty="0"/>
+              <a:t>) + (4 x 10</a:t>
+            </a:r>
+            <a:r>
+              <a:rPr lang="en-US" baseline="30000" dirty="0"/>
+              <a:t>1</a:t>
+            </a:r>
+            <a:r>
+              <a:rPr lang="en-US" dirty="0"/>
+              <a:t>) + (2 x 10</a:t>
+            </a:r>
+            <a:r>
+              <a:rPr lang="en-US" baseline="30000" dirty="0"/>
+              <a:t>0</a:t>
+            </a:r>
+            <a:r>
+              <a:rPr lang="en-US" dirty="0"/>
+              <a:t>)</a:t>
+            </a:r>
+            <a:endParaRPr lang="en-US" baseline="30000" dirty="0"/>
           </a:p>
           <a:p>
             <a:pPr algn="l"/>
             <a:r>
               <a:rPr lang="en-US" dirty="0"/>
-              <a:t>In this expression, the digit 3 represents 3 groups of 100 (or 3 x 10^2), the digit 4 represents 4 groups of 10 (or 4 x 10^1), and the digit 2 represents 2 units (or 2 x 10^0).</a:t>
-            </a:r>
-          </a:p>
+              <a:t>In this expression:</a:t>
+            </a:r>
+          </a:p>
+        </p:txBody>
+      </p:sp>
+      <p:graphicFrame>
+        <p:nvGraphicFramePr>
+          <p:cNvPr id="4" name="Table 4">
+            <a:extLst>
+              <a:ext uri="{FF2B5EF4-FFF2-40B4-BE49-F238E27FC236}">
+                <a16:creationId xmlns:a16="http://schemas.microsoft.com/office/drawing/2014/main" id="{1A9217CE-F39C-8717-5C5E-1B4D018B692D}"/>
+              </a:ext>
+            </a:extLst>
+          </p:cNvPr>
+          <p:cNvGraphicFramePr>
+            <a:graphicFrameLocks noGrp="1"/>
+          </p:cNvGraphicFramePr>
+          <p:nvPr>
+            <p:extLst>
+              <p:ext uri="{D42A27DB-BD31-4B8C-83A1-F6EECF244321}">
+                <p14:modId xmlns:p14="http://schemas.microsoft.com/office/powerpoint/2010/main" val="1005819707"/>
+              </p:ext>
+            </p:extLst>
+          </p:nvPr>
+        </p:nvGraphicFramePr>
+        <p:xfrm>
+          <a:off x="607484" y="3203358"/>
+          <a:ext cx="11177104" cy="1828800"/>
+        </p:xfrm>
+        <a:graphic>
+          <a:graphicData uri="http://schemas.openxmlformats.org/drawingml/2006/table">
+            <a:tbl>
+              <a:tblPr firstRow="1" bandRow="1">
+                <a:tableStyleId>{2D5ABB26-0587-4C30-8999-92F81FD0307C}</a:tableStyleId>
+              </a:tblPr>
+              <a:tblGrid>
+                <a:gridCol w="9574842">
+                  <a:extLst>
+                    <a:ext uri="{9D8B030D-6E8A-4147-A177-3AD203B41FA5}">
+                      <a16:colId xmlns:a16="http://schemas.microsoft.com/office/drawing/2014/main" val="3556386190"/>
+                    </a:ext>
+                  </a:extLst>
+                </a:gridCol>
+                <a:gridCol w="380276">
+                  <a:extLst>
+                    <a:ext uri="{9D8B030D-6E8A-4147-A177-3AD203B41FA5}">
+                      <a16:colId xmlns:a16="http://schemas.microsoft.com/office/drawing/2014/main" val="1967796704"/>
+                    </a:ext>
+                  </a:extLst>
+                </a:gridCol>
+                <a:gridCol w="1221986">
+                  <a:extLst>
+                    <a:ext uri="{9D8B030D-6E8A-4147-A177-3AD203B41FA5}">
+                      <a16:colId xmlns:a16="http://schemas.microsoft.com/office/drawing/2014/main" val="1835788875"/>
+                    </a:ext>
+                  </a:extLst>
+                </a:gridCol>
+              </a:tblGrid>
+              <a:tr h="0">
+                <a:tc>
+                  <a:txBody>
+                    <a:bodyPr/>
+                    <a:lstStyle/>
+                    <a:p>
+                      <a:pPr marL="0" indent="0" algn="l">
+                        <a:buFont typeface="Arial" panose="020B0604020202020204" pitchFamily="34" charset="0"/>
+                        <a:buNone/>
+                      </a:pPr>
+                      <a:r>
+                        <a:rPr lang="en-US" dirty="0">
+                          <a:solidFill>
+                            <a:schemeClr val="accent1"/>
+                          </a:solidFill>
+                        </a:rPr>
+                        <a:t>The digit 3 represents 3 groups of 10</a:t>
+                      </a:r>
+                      <a:r>
+                        <a:rPr lang="en-US" baseline="30000" dirty="0">
+                          <a:solidFill>
+                            <a:schemeClr val="accent1"/>
+                          </a:solidFill>
+                        </a:rPr>
+                        <a:t>2 </a:t>
+                      </a:r>
+                      <a:r>
+                        <a:rPr lang="en-US" baseline="0" dirty="0">
+                          <a:solidFill>
+                            <a:schemeClr val="accent1"/>
+                          </a:solidFill>
+                        </a:rPr>
+                        <a:t>( = 100)</a:t>
+                      </a:r>
+                      <a:endParaRPr lang="en-US" dirty="0">
+                        <a:solidFill>
+                          <a:schemeClr val="accent1"/>
+                        </a:solidFill>
+                      </a:endParaRPr>
+                    </a:p>
+                  </a:txBody>
+                  <a:tcPr/>
+                </a:tc>
+                <a:tc>
+                  <a:txBody>
+                    <a:bodyPr/>
+                    <a:lstStyle/>
+                    <a:p>
+                      <a:pPr marL="0" indent="0" algn="l">
+                        <a:buFont typeface="Arial" panose="020B0604020202020204" pitchFamily="34" charset="0"/>
+                        <a:buNone/>
+                      </a:pPr>
+                      <a:endParaRPr lang="en-US" dirty="0">
+                        <a:solidFill>
+                          <a:schemeClr val="accent1"/>
+                        </a:solidFill>
+                      </a:endParaRPr>
+                    </a:p>
+                  </a:txBody>
+                  <a:tcPr/>
+                </a:tc>
+                <a:tc>
+                  <a:txBody>
+                    <a:bodyPr/>
+                    <a:lstStyle/>
+                    <a:p>
+                      <a:pPr algn="r"/>
+                      <a:r>
+                        <a:rPr lang="en-US" dirty="0">
+                          <a:solidFill>
+                            <a:schemeClr val="accent1"/>
+                          </a:solidFill>
+                        </a:rPr>
+                        <a:t>300</a:t>
+                      </a:r>
+                    </a:p>
+                  </a:txBody>
+                  <a:tcPr/>
+                </a:tc>
+                <a:extLst>
+                  <a:ext uri="{0D108BD9-81ED-4DB2-BD59-A6C34878D82A}">
+                    <a16:rowId xmlns:a16="http://schemas.microsoft.com/office/drawing/2014/main" val="1309954590"/>
+                  </a:ext>
+                </a:extLst>
+              </a:tr>
+              <a:tr h="370840">
+                <a:tc>
+                  <a:txBody>
+                    <a:bodyPr/>
+                    <a:lstStyle/>
+                    <a:p>
+                      <a:pPr marL="0" indent="0" algn="l">
+                        <a:buFont typeface="Arial" panose="020B0604020202020204" pitchFamily="34" charset="0"/>
+                        <a:buNone/>
+                      </a:pPr>
+                      <a:r>
+                        <a:rPr lang="en-US" dirty="0">
+                          <a:solidFill>
+                            <a:schemeClr val="accent1"/>
+                          </a:solidFill>
+                        </a:rPr>
+                        <a:t>The digit 4 represents 4 groups of 10</a:t>
+                      </a:r>
+                      <a:r>
+                        <a:rPr lang="en-US" baseline="30000" dirty="0">
+                          <a:solidFill>
+                            <a:schemeClr val="accent1"/>
+                          </a:solidFill>
+                        </a:rPr>
+                        <a:t>1 </a:t>
+                      </a:r>
+                      <a:r>
+                        <a:rPr lang="en-US" baseline="0" dirty="0">
+                          <a:solidFill>
+                            <a:schemeClr val="accent1"/>
+                          </a:solidFill>
+                        </a:rPr>
+                        <a:t>( = 10)</a:t>
+                      </a:r>
+                      <a:endParaRPr lang="en-US" dirty="0">
+                        <a:solidFill>
+                          <a:schemeClr val="accent1"/>
+                        </a:solidFill>
+                      </a:endParaRPr>
+                    </a:p>
+                  </a:txBody>
+                  <a:tcPr/>
+                </a:tc>
+                <a:tc>
+                  <a:txBody>
+                    <a:bodyPr/>
+                    <a:lstStyle/>
+                    <a:p>
+                      <a:pPr marL="0" indent="0" algn="l">
+                        <a:buFont typeface="Arial" panose="020B0604020202020204" pitchFamily="34" charset="0"/>
+                        <a:buNone/>
+                      </a:pPr>
+                      <a:r>
+                        <a:rPr lang="en-US" dirty="0">
+                          <a:solidFill>
+                            <a:schemeClr val="accent1"/>
+                          </a:solidFill>
+                        </a:rPr>
+                        <a:t>+</a:t>
+                      </a:r>
+                    </a:p>
+                  </a:txBody>
+                  <a:tcPr/>
+                </a:tc>
+                <a:tc>
+                  <a:txBody>
+                    <a:bodyPr/>
+                    <a:lstStyle/>
+                    <a:p>
+                      <a:pPr algn="r"/>
+                      <a:r>
+                        <a:rPr lang="en-US" dirty="0">
+                          <a:solidFill>
+                            <a:schemeClr val="accent1"/>
+                          </a:solidFill>
+                        </a:rPr>
+                        <a:t>40</a:t>
+                      </a:r>
+                    </a:p>
+                  </a:txBody>
+                  <a:tcPr/>
+                </a:tc>
+                <a:extLst>
+                  <a:ext uri="{0D108BD9-81ED-4DB2-BD59-A6C34878D82A}">
+                    <a16:rowId xmlns:a16="http://schemas.microsoft.com/office/drawing/2014/main" val="1193100459"/>
+                  </a:ext>
+                </a:extLst>
+              </a:tr>
+              <a:tr h="370840">
+                <a:tc>
+                  <a:txBody>
+                    <a:bodyPr/>
+                    <a:lstStyle/>
+                    <a:p>
+                      <a:pPr marL="0" marR="0" lvl="0" indent="0" algn="l" defTabSz="609585" rtl="0" eaLnBrk="1" fontAlgn="auto" latinLnBrk="0" hangingPunct="1">
+                        <a:lnSpc>
+                          <a:spcPct val="100000"/>
+                        </a:lnSpc>
+                        <a:spcBef>
+                          <a:spcPts val="0"/>
+                        </a:spcBef>
+                        <a:spcAft>
+                          <a:spcPts val="0"/>
+                        </a:spcAft>
+                        <a:buClrTx/>
+                        <a:buSzTx/>
+                        <a:buFontTx/>
+                        <a:buNone/>
+                        <a:tabLst/>
+                        <a:defRPr/>
+                      </a:pPr>
+                      <a:r>
+                        <a:rPr lang="en-US" dirty="0">
+                          <a:solidFill>
+                            <a:schemeClr val="accent1"/>
+                          </a:solidFill>
+                        </a:rPr>
+                        <a:t>The digit 2 represents 2 groups of 10</a:t>
+                      </a:r>
+                      <a:r>
+                        <a:rPr lang="en-US" baseline="30000" dirty="0">
+                          <a:solidFill>
+                            <a:schemeClr val="accent1"/>
+                          </a:solidFill>
+                        </a:rPr>
+                        <a:t>0 </a:t>
+                      </a:r>
+                      <a:r>
+                        <a:rPr lang="en-US" baseline="0" dirty="0">
+                          <a:solidFill>
+                            <a:schemeClr val="accent1"/>
+                          </a:solidFill>
+                        </a:rPr>
+                        <a:t>( = 1)</a:t>
+                      </a:r>
+                      <a:endParaRPr lang="en-US" dirty="0">
+                        <a:solidFill>
+                          <a:schemeClr val="accent1"/>
+                        </a:solidFill>
+                      </a:endParaRPr>
+                    </a:p>
+                  </a:txBody>
+                  <a:tcPr/>
+                </a:tc>
+                <a:tc>
+                  <a:txBody>
+                    <a:bodyPr/>
+                    <a:lstStyle/>
+                    <a:p>
+                      <a:pPr marL="0" marR="0" lvl="0" indent="0" algn="l" defTabSz="609585" rtl="0" eaLnBrk="1" fontAlgn="auto" latinLnBrk="0" hangingPunct="1">
+                        <a:lnSpc>
+                          <a:spcPct val="100000"/>
+                        </a:lnSpc>
+                        <a:spcBef>
+                          <a:spcPts val="0"/>
+                        </a:spcBef>
+                        <a:spcAft>
+                          <a:spcPts val="0"/>
+                        </a:spcAft>
+                        <a:buClrTx/>
+                        <a:buSzTx/>
+                        <a:buFontTx/>
+                        <a:buNone/>
+                        <a:tabLst/>
+                        <a:defRPr/>
+                      </a:pPr>
+                      <a:r>
+                        <a:rPr lang="en-US" dirty="0">
+                          <a:solidFill>
+                            <a:schemeClr val="accent1"/>
+                          </a:solidFill>
+                        </a:rPr>
+                        <a:t>+</a:t>
+                      </a:r>
+                    </a:p>
+                  </a:txBody>
+                  <a:tcPr/>
+                </a:tc>
+                <a:tc>
+                  <a:txBody>
+                    <a:bodyPr/>
+                    <a:lstStyle/>
+                    <a:p>
+                      <a:pPr algn="r"/>
+                      <a:r>
+                        <a:rPr lang="en-US" dirty="0">
+                          <a:solidFill>
+                            <a:schemeClr val="accent1"/>
+                          </a:solidFill>
+                        </a:rPr>
+                        <a:t>2</a:t>
+                      </a:r>
+                    </a:p>
+                  </a:txBody>
+                  <a:tcPr/>
+                </a:tc>
+                <a:extLst>
+                  <a:ext uri="{0D108BD9-81ED-4DB2-BD59-A6C34878D82A}">
+                    <a16:rowId xmlns:a16="http://schemas.microsoft.com/office/drawing/2014/main" val="589228455"/>
+                  </a:ext>
+                </a:extLst>
+              </a:tr>
+              <a:tr h="370840">
+                <a:tc>
+                  <a:txBody>
+                    <a:bodyPr/>
+                    <a:lstStyle/>
+                    <a:p>
+                      <a:pPr algn="r"/>
+                      <a:r>
+                        <a:rPr lang="en-US" dirty="0">
+                          <a:solidFill>
+                            <a:schemeClr val="accent1"/>
+                          </a:solidFill>
+                        </a:rPr>
+                        <a:t>Total:</a:t>
+                      </a:r>
+                    </a:p>
+                  </a:txBody>
+                  <a:tcPr/>
+                </a:tc>
+                <a:tc>
+                  <a:txBody>
+                    <a:bodyPr/>
+                    <a:lstStyle/>
+                    <a:p>
+                      <a:pPr marL="0" algn="l" defTabSz="609585" rtl="0" eaLnBrk="1" latinLnBrk="0" hangingPunct="1"/>
+                      <a:r>
+                        <a:rPr lang="en-US" dirty="0">
+                          <a:solidFill>
+                            <a:schemeClr val="accent1"/>
+                          </a:solidFill>
+                        </a:rPr>
+                        <a:t>=</a:t>
+                      </a:r>
+                    </a:p>
+                  </a:txBody>
+                  <a:tcPr/>
+                </a:tc>
+                <a:tc>
+                  <a:txBody>
+                    <a:bodyPr/>
+                    <a:lstStyle/>
+                    <a:p>
+                      <a:pPr algn="r"/>
+                      <a:r>
+                        <a:rPr lang="en-US" dirty="0">
+                          <a:solidFill>
+                            <a:schemeClr val="accent1"/>
+                          </a:solidFill>
+                        </a:rPr>
+                        <a:t>342</a:t>
+                      </a:r>
+                    </a:p>
+                  </a:txBody>
+                  <a:tcPr/>
+                </a:tc>
+                <a:extLst>
+                  <a:ext uri="{0D108BD9-81ED-4DB2-BD59-A6C34878D82A}">
+                    <a16:rowId xmlns:a16="http://schemas.microsoft.com/office/drawing/2014/main" val="2970985595"/>
+                  </a:ext>
+                </a:extLst>
+              </a:tr>
+            </a:tbl>
+          </a:graphicData>
+        </a:graphic>
+      </p:graphicFrame>
+      <p:sp>
+        <p:nvSpPr>
+          <p:cNvPr id="6" name="TextBox 5">
+            <a:extLst>
+              <a:ext uri="{FF2B5EF4-FFF2-40B4-BE49-F238E27FC236}">
+                <a16:creationId xmlns:a16="http://schemas.microsoft.com/office/drawing/2014/main" id="{6345D9AE-7878-E4A8-665D-3B973956BFB0}"/>
+              </a:ext>
+            </a:extLst>
+          </p:cNvPr>
+          <p:cNvSpPr txBox="1"/>
+          <p:nvPr/>
+        </p:nvSpPr>
+        <p:spPr>
+          <a:xfrm>
+            <a:off x="0" y="5335920"/>
+            <a:ext cx="12191999" cy="461665"/>
+          </a:xfrm>
+          <a:prstGeom prst="rect">
+            <a:avLst/>
+          </a:prstGeom>
+          <a:noFill/>
+        </p:spPr>
+        <p:txBody>
+          <a:bodyPr wrap="square">
+            <a:spAutoFit/>
+          </a:bodyPr>
+          <a:lstStyle/>
           <a:p>
             <a:pPr algn="ctr"/>
             <a:r>
-              <a:rPr lang="en-US" dirty="0"/>
+              <a:rPr lang="en-US" sz="2400" dirty="0"/>
               <a:t>For our examples, we will use base 27 numbers.</a:t>
             </a:r>
           </a:p>
@@ -12776,8 +13235,8 @@
         </p:nvSpPr>
         <p:spPr>
           <a:xfrm>
-            <a:off x="607484" y="1576298"/>
-            <a:ext cx="10970683" cy="4567767"/>
+            <a:off x="607484" y="2982487"/>
+            <a:ext cx="11202803" cy="3341044"/>
           </a:xfrm>
         </p:spPr>
         <p:txBody>
@@ -12792,41 +13251,31 @@
                   <a:schemeClr val="accent1"/>
                 </a:solidFill>
               </a:rPr>
-              <a:t>Because RSA is a mathematical algorithm, we must first convert the text to a number…</a:t>
-            </a:r>
-          </a:p>
-          <a:p>
+              <a:t>1. Convert each character to a number between 1 and 26.</a:t>
+            </a:r>
+          </a:p>
+          <a:p>
+            <a:pPr algn="ctr"/>
             <a:r>
               <a:rPr lang="en-US" dirty="0">
                 <a:solidFill>
                   <a:schemeClr val="accent1"/>
                 </a:solidFill>
               </a:rPr>
-              <a:t>1. Convert each character to a number between 1 and 26.</a:t>
-            </a:r>
-          </a:p>
-          <a:p>
-            <a:pPr algn="ctr"/>
+              <a:t>D = 4, A = 1, V = 22, E = 5</a:t>
+            </a:r>
+          </a:p>
+          <a:p>
+            <a:pPr marL="0" lvl="1" indent="0">
+              <a:buNone/>
+            </a:pPr>
             <a:r>
               <a:rPr lang="en-US" dirty="0">
                 <a:solidFill>
                   <a:schemeClr val="accent1"/>
                 </a:solidFill>
               </a:rPr>
-              <a:t>DAVE == 4, 1, 22, 5</a:t>
-            </a:r>
-          </a:p>
-          <a:p>
-            <a:pPr marL="0" lvl="1" indent="0">
-              <a:buNone/>
-            </a:pPr>
-            <a:r>
-              <a:rPr lang="en-US" dirty="0">
-                <a:solidFill>
-                  <a:schemeClr val="accent1"/>
-                </a:solidFill>
-              </a:rPr>
-              <a:t>2. Take each of these numbers and convert them to base 27 digits. </a:t>
+              <a:t>2. Take each of these digits and treat them as base 27 positional digits. </a:t>
             </a:r>
           </a:p>
           <a:p>
@@ -12930,6 +13379,623 @@
                 </a:solidFill>
               </a:rPr>
               <a:t>78732 + 729 + 594 + 5 = 80060</a:t>
+            </a:r>
+          </a:p>
+        </p:txBody>
+      </p:sp>
+      <p:graphicFrame>
+        <p:nvGraphicFramePr>
+          <p:cNvPr id="7" name="Table 7">
+            <a:extLst>
+              <a:ext uri="{FF2B5EF4-FFF2-40B4-BE49-F238E27FC236}">
+                <a16:creationId xmlns:a16="http://schemas.microsoft.com/office/drawing/2014/main" id="{67FED7EB-86A6-D2ED-0350-6E163BC58777}"/>
+              </a:ext>
+            </a:extLst>
+          </p:cNvPr>
+          <p:cNvGraphicFramePr>
+            <a:graphicFrameLocks noGrp="1"/>
+          </p:cNvGraphicFramePr>
+          <p:nvPr>
+            <p:extLst>
+              <p:ext uri="{D42A27DB-BD31-4B8C-83A1-F6EECF244321}">
+                <p14:modId xmlns:p14="http://schemas.microsoft.com/office/powerpoint/2010/main" val="2266488981"/>
+              </p:ext>
+            </p:extLst>
+          </p:nvPr>
+        </p:nvGraphicFramePr>
+        <p:xfrm>
+          <a:off x="607484" y="2019504"/>
+          <a:ext cx="10972800" cy="633694"/>
+        </p:xfrm>
+        <a:graphic>
+          <a:graphicData uri="http://schemas.openxmlformats.org/drawingml/2006/table">
+            <a:tbl>
+              <a:tblPr firstRow="1" bandRow="1">
+                <a:tableStyleId>{5C22544A-7EE6-4342-B048-85BDC9FD1C3A}</a:tableStyleId>
+              </a:tblPr>
+              <a:tblGrid>
+                <a:gridCol w="685800">
+                  <a:extLst>
+                    <a:ext uri="{9D8B030D-6E8A-4147-A177-3AD203B41FA5}">
+                      <a16:colId xmlns:a16="http://schemas.microsoft.com/office/drawing/2014/main" val="3661507132"/>
+                    </a:ext>
+                  </a:extLst>
+                </a:gridCol>
+                <a:gridCol w="685800">
+                  <a:extLst>
+                    <a:ext uri="{9D8B030D-6E8A-4147-A177-3AD203B41FA5}">
+                      <a16:colId xmlns:a16="http://schemas.microsoft.com/office/drawing/2014/main" val="2258977791"/>
+                    </a:ext>
+                  </a:extLst>
+                </a:gridCol>
+                <a:gridCol w="685800">
+                  <a:extLst>
+                    <a:ext uri="{9D8B030D-6E8A-4147-A177-3AD203B41FA5}">
+                      <a16:colId xmlns:a16="http://schemas.microsoft.com/office/drawing/2014/main" val="2734847252"/>
+                    </a:ext>
+                  </a:extLst>
+                </a:gridCol>
+                <a:gridCol w="685800">
+                  <a:extLst>
+                    <a:ext uri="{9D8B030D-6E8A-4147-A177-3AD203B41FA5}">
+                      <a16:colId xmlns:a16="http://schemas.microsoft.com/office/drawing/2014/main" val="220842555"/>
+                    </a:ext>
+                  </a:extLst>
+                </a:gridCol>
+                <a:gridCol w="685800">
+                  <a:extLst>
+                    <a:ext uri="{9D8B030D-6E8A-4147-A177-3AD203B41FA5}">
+                      <a16:colId xmlns:a16="http://schemas.microsoft.com/office/drawing/2014/main" val="2883168314"/>
+                    </a:ext>
+                  </a:extLst>
+                </a:gridCol>
+                <a:gridCol w="685800">
+                  <a:extLst>
+                    <a:ext uri="{9D8B030D-6E8A-4147-A177-3AD203B41FA5}">
+                      <a16:colId xmlns:a16="http://schemas.microsoft.com/office/drawing/2014/main" val="3305880703"/>
+                    </a:ext>
+                  </a:extLst>
+                </a:gridCol>
+                <a:gridCol w="685800">
+                  <a:extLst>
+                    <a:ext uri="{9D8B030D-6E8A-4147-A177-3AD203B41FA5}">
+                      <a16:colId xmlns:a16="http://schemas.microsoft.com/office/drawing/2014/main" val="1708057372"/>
+                    </a:ext>
+                  </a:extLst>
+                </a:gridCol>
+                <a:gridCol w="685800">
+                  <a:extLst>
+                    <a:ext uri="{9D8B030D-6E8A-4147-A177-3AD203B41FA5}">
+                      <a16:colId xmlns:a16="http://schemas.microsoft.com/office/drawing/2014/main" val="2180236203"/>
+                    </a:ext>
+                  </a:extLst>
+                </a:gridCol>
+                <a:gridCol w="685800">
+                  <a:extLst>
+                    <a:ext uri="{9D8B030D-6E8A-4147-A177-3AD203B41FA5}">
+                      <a16:colId xmlns:a16="http://schemas.microsoft.com/office/drawing/2014/main" val="3405675218"/>
+                    </a:ext>
+                  </a:extLst>
+                </a:gridCol>
+                <a:gridCol w="685800">
+                  <a:extLst>
+                    <a:ext uri="{9D8B030D-6E8A-4147-A177-3AD203B41FA5}">
+                      <a16:colId xmlns:a16="http://schemas.microsoft.com/office/drawing/2014/main" val="2827398762"/>
+                    </a:ext>
+                  </a:extLst>
+                </a:gridCol>
+                <a:gridCol w="685800">
+                  <a:extLst>
+                    <a:ext uri="{9D8B030D-6E8A-4147-A177-3AD203B41FA5}">
+                      <a16:colId xmlns:a16="http://schemas.microsoft.com/office/drawing/2014/main" val="587142459"/>
+                    </a:ext>
+                  </a:extLst>
+                </a:gridCol>
+                <a:gridCol w="685800">
+                  <a:extLst>
+                    <a:ext uri="{9D8B030D-6E8A-4147-A177-3AD203B41FA5}">
+                      <a16:colId xmlns:a16="http://schemas.microsoft.com/office/drawing/2014/main" val="1202868021"/>
+                    </a:ext>
+                  </a:extLst>
+                </a:gridCol>
+                <a:gridCol w="685800">
+                  <a:extLst>
+                    <a:ext uri="{9D8B030D-6E8A-4147-A177-3AD203B41FA5}">
+                      <a16:colId xmlns:a16="http://schemas.microsoft.com/office/drawing/2014/main" val="4223889899"/>
+                    </a:ext>
+                  </a:extLst>
+                </a:gridCol>
+                <a:gridCol w="685800">
+                  <a:extLst>
+                    <a:ext uri="{9D8B030D-6E8A-4147-A177-3AD203B41FA5}">
+                      <a16:colId xmlns:a16="http://schemas.microsoft.com/office/drawing/2014/main" val="1766071823"/>
+                    </a:ext>
+                  </a:extLst>
+                </a:gridCol>
+                <a:gridCol w="685800">
+                  <a:extLst>
+                    <a:ext uri="{9D8B030D-6E8A-4147-A177-3AD203B41FA5}">
+                      <a16:colId xmlns:a16="http://schemas.microsoft.com/office/drawing/2014/main" val="549825611"/>
+                    </a:ext>
+                  </a:extLst>
+                </a:gridCol>
+                <a:gridCol w="685800">
+                  <a:extLst>
+                    <a:ext uri="{9D8B030D-6E8A-4147-A177-3AD203B41FA5}">
+                      <a16:colId xmlns:a16="http://schemas.microsoft.com/office/drawing/2014/main" val="2619129629"/>
+                    </a:ext>
+                  </a:extLst>
+                </a:gridCol>
+              </a:tblGrid>
+              <a:tr h="278253">
+                <a:tc>
+                  <a:txBody>
+                    <a:bodyPr/>
+                    <a:lstStyle/>
+                    <a:p>
+                      <a:r>
+                        <a:rPr lang="en-US" sz="1400" dirty="0"/>
+                        <a:t>A</a:t>
+                      </a:r>
+                    </a:p>
+                  </a:txBody>
+                  <a:tcPr/>
+                </a:tc>
+                <a:tc>
+                  <a:txBody>
+                    <a:bodyPr/>
+                    <a:lstStyle/>
+                    <a:p>
+                      <a:r>
+                        <a:rPr lang="en-US" sz="1400" dirty="0"/>
+                        <a:t>B</a:t>
+                      </a:r>
+                    </a:p>
+                  </a:txBody>
+                  <a:tcPr/>
+                </a:tc>
+                <a:tc>
+                  <a:txBody>
+                    <a:bodyPr/>
+                    <a:lstStyle/>
+                    <a:p>
+                      <a:r>
+                        <a:rPr lang="en-US" sz="1400" dirty="0"/>
+                        <a:t>C</a:t>
+                      </a:r>
+                    </a:p>
+                  </a:txBody>
+                  <a:tcPr/>
+                </a:tc>
+                <a:tc>
+                  <a:txBody>
+                    <a:bodyPr/>
+                    <a:lstStyle/>
+                    <a:p>
+                      <a:r>
+                        <a:rPr lang="en-US" sz="1400" dirty="0"/>
+                        <a:t>D</a:t>
+                      </a:r>
+                    </a:p>
+                  </a:txBody>
+                  <a:tcPr/>
+                </a:tc>
+                <a:tc>
+                  <a:txBody>
+                    <a:bodyPr/>
+                    <a:lstStyle/>
+                    <a:p>
+                      <a:r>
+                        <a:rPr lang="en-US" sz="1400" dirty="0"/>
+                        <a:t>E</a:t>
+                      </a:r>
+                    </a:p>
+                  </a:txBody>
+                  <a:tcPr/>
+                </a:tc>
+                <a:tc>
+                  <a:txBody>
+                    <a:bodyPr/>
+                    <a:lstStyle/>
+                    <a:p>
+                      <a:r>
+                        <a:rPr lang="en-US" sz="1400" dirty="0"/>
+                        <a:t>F</a:t>
+                      </a:r>
+                    </a:p>
+                  </a:txBody>
+                  <a:tcPr/>
+                </a:tc>
+                <a:tc>
+                  <a:txBody>
+                    <a:bodyPr/>
+                    <a:lstStyle/>
+                    <a:p>
+                      <a:r>
+                        <a:rPr lang="en-US" sz="1400" dirty="0"/>
+                        <a:t>G</a:t>
+                      </a:r>
+                    </a:p>
+                  </a:txBody>
+                  <a:tcPr/>
+                </a:tc>
+                <a:tc>
+                  <a:txBody>
+                    <a:bodyPr/>
+                    <a:lstStyle/>
+                    <a:p>
+                      <a:r>
+                        <a:rPr lang="en-US" sz="1400" dirty="0"/>
+                        <a:t>H</a:t>
+                      </a:r>
+                    </a:p>
+                  </a:txBody>
+                  <a:tcPr/>
+                </a:tc>
+                <a:tc>
+                  <a:txBody>
+                    <a:bodyPr/>
+                    <a:lstStyle/>
+                    <a:p>
+                      <a:r>
+                        <a:rPr lang="en-US" sz="1400" dirty="0"/>
+                        <a:t>I</a:t>
+                      </a:r>
+                    </a:p>
+                  </a:txBody>
+                  <a:tcPr/>
+                </a:tc>
+                <a:tc>
+                  <a:txBody>
+                    <a:bodyPr/>
+                    <a:lstStyle/>
+                    <a:p>
+                      <a:r>
+                        <a:rPr lang="en-US" sz="1400" dirty="0"/>
+                        <a:t>J</a:t>
+                      </a:r>
+                    </a:p>
+                  </a:txBody>
+                  <a:tcPr/>
+                </a:tc>
+                <a:tc>
+                  <a:txBody>
+                    <a:bodyPr/>
+                    <a:lstStyle/>
+                    <a:p>
+                      <a:r>
+                        <a:rPr lang="en-US" sz="1400" dirty="0"/>
+                        <a:t>K</a:t>
+                      </a:r>
+                    </a:p>
+                  </a:txBody>
+                  <a:tcPr/>
+                </a:tc>
+                <a:tc>
+                  <a:txBody>
+                    <a:bodyPr/>
+                    <a:lstStyle/>
+                    <a:p>
+                      <a:r>
+                        <a:rPr lang="en-US" sz="1400" dirty="0"/>
+                        <a:t>L</a:t>
+                      </a:r>
+                    </a:p>
+                  </a:txBody>
+                  <a:tcPr/>
+                </a:tc>
+                <a:tc>
+                  <a:txBody>
+                    <a:bodyPr/>
+                    <a:lstStyle/>
+                    <a:p>
+                      <a:r>
+                        <a:rPr lang="en-US" sz="1400" dirty="0"/>
+                        <a:t>M</a:t>
+                      </a:r>
+                    </a:p>
+                  </a:txBody>
+                  <a:tcPr/>
+                </a:tc>
+                <a:tc>
+                  <a:txBody>
+                    <a:bodyPr/>
+                    <a:lstStyle/>
+                    <a:p>
+                      <a:r>
+                        <a:rPr lang="en-US" sz="1400" dirty="0"/>
+                        <a:t>N</a:t>
+                      </a:r>
+                    </a:p>
+                  </a:txBody>
+                  <a:tcPr/>
+                </a:tc>
+                <a:tc>
+                  <a:txBody>
+                    <a:bodyPr/>
+                    <a:lstStyle/>
+                    <a:p>
+                      <a:r>
+                        <a:rPr lang="en-US" sz="1400" dirty="0"/>
+                        <a:t>O</a:t>
+                      </a:r>
+                    </a:p>
+                  </a:txBody>
+                  <a:tcPr/>
+                </a:tc>
+                <a:tc>
+                  <a:txBody>
+                    <a:bodyPr/>
+                    <a:lstStyle/>
+                    <a:p>
+                      <a:r>
+                        <a:rPr lang="en-US" sz="1400" dirty="0"/>
+                        <a:t>…</a:t>
+                      </a:r>
+                    </a:p>
+                  </a:txBody>
+                  <a:tcPr/>
+                </a:tc>
+                <a:extLst>
+                  <a:ext uri="{0D108BD9-81ED-4DB2-BD59-A6C34878D82A}">
+                    <a16:rowId xmlns:a16="http://schemas.microsoft.com/office/drawing/2014/main" val="1572714276"/>
+                  </a:ext>
+                </a:extLst>
+              </a:tr>
+              <a:tr h="328894">
+                <a:tc>
+                  <a:txBody>
+                    <a:bodyPr/>
+                    <a:lstStyle/>
+                    <a:p>
+                      <a:r>
+                        <a:rPr lang="en-US" sz="1400" dirty="0"/>
+                        <a:t>1</a:t>
+                      </a:r>
+                    </a:p>
+                  </a:txBody>
+                  <a:tcPr/>
+                </a:tc>
+                <a:tc>
+                  <a:txBody>
+                    <a:bodyPr/>
+                    <a:lstStyle/>
+                    <a:p>
+                      <a:r>
+                        <a:rPr lang="en-US" sz="1400" dirty="0"/>
+                        <a:t>2</a:t>
+                      </a:r>
+                    </a:p>
+                  </a:txBody>
+                  <a:tcPr/>
+                </a:tc>
+                <a:tc>
+                  <a:txBody>
+                    <a:bodyPr/>
+                    <a:lstStyle/>
+                    <a:p>
+                      <a:r>
+                        <a:rPr lang="en-US" sz="1400" dirty="0"/>
+                        <a:t>3</a:t>
+                      </a:r>
+                    </a:p>
+                  </a:txBody>
+                  <a:tcPr/>
+                </a:tc>
+                <a:tc>
+                  <a:txBody>
+                    <a:bodyPr/>
+                    <a:lstStyle/>
+                    <a:p>
+                      <a:r>
+                        <a:rPr lang="en-US" sz="1400" dirty="0"/>
+                        <a:t>4</a:t>
+                      </a:r>
+                    </a:p>
+                  </a:txBody>
+                  <a:tcPr/>
+                </a:tc>
+                <a:tc>
+                  <a:txBody>
+                    <a:bodyPr/>
+                    <a:lstStyle/>
+                    <a:p>
+                      <a:r>
+                        <a:rPr lang="en-US" sz="1400" dirty="0"/>
+                        <a:t>5</a:t>
+                      </a:r>
+                    </a:p>
+                  </a:txBody>
+                  <a:tcPr/>
+                </a:tc>
+                <a:tc>
+                  <a:txBody>
+                    <a:bodyPr/>
+                    <a:lstStyle/>
+                    <a:p>
+                      <a:r>
+                        <a:rPr lang="en-US" sz="1400" dirty="0"/>
+                        <a:t>6</a:t>
+                      </a:r>
+                    </a:p>
+                  </a:txBody>
+                  <a:tcPr/>
+                </a:tc>
+                <a:tc>
+                  <a:txBody>
+                    <a:bodyPr/>
+                    <a:lstStyle/>
+                    <a:p>
+                      <a:r>
+                        <a:rPr lang="en-US" sz="1400" dirty="0"/>
+                        <a:t>7</a:t>
+                      </a:r>
+                    </a:p>
+                  </a:txBody>
+                  <a:tcPr/>
+                </a:tc>
+                <a:tc>
+                  <a:txBody>
+                    <a:bodyPr/>
+                    <a:lstStyle/>
+                    <a:p>
+                      <a:r>
+                        <a:rPr lang="en-US" sz="1400" dirty="0"/>
+                        <a:t>8</a:t>
+                      </a:r>
+                    </a:p>
+                  </a:txBody>
+                  <a:tcPr/>
+                </a:tc>
+                <a:tc>
+                  <a:txBody>
+                    <a:bodyPr/>
+                    <a:lstStyle/>
+                    <a:p>
+                      <a:r>
+                        <a:rPr lang="en-US" sz="1400" dirty="0"/>
+                        <a:t>9</a:t>
+                      </a:r>
+                    </a:p>
+                  </a:txBody>
+                  <a:tcPr/>
+                </a:tc>
+                <a:tc>
+                  <a:txBody>
+                    <a:bodyPr/>
+                    <a:lstStyle/>
+                    <a:p>
+                      <a:r>
+                        <a:rPr lang="en-US" sz="1400" dirty="0"/>
+                        <a:t>10</a:t>
+                      </a:r>
+                    </a:p>
+                  </a:txBody>
+                  <a:tcPr/>
+                </a:tc>
+                <a:tc>
+                  <a:txBody>
+                    <a:bodyPr/>
+                    <a:lstStyle/>
+                    <a:p>
+                      <a:r>
+                        <a:rPr lang="en-US" sz="1400" dirty="0"/>
+                        <a:t>11</a:t>
+                      </a:r>
+                    </a:p>
+                  </a:txBody>
+                  <a:tcPr/>
+                </a:tc>
+                <a:tc>
+                  <a:txBody>
+                    <a:bodyPr/>
+                    <a:lstStyle/>
+                    <a:p>
+                      <a:r>
+                        <a:rPr lang="en-US" sz="1400" dirty="0"/>
+                        <a:t>12</a:t>
+                      </a:r>
+                    </a:p>
+                  </a:txBody>
+                  <a:tcPr/>
+                </a:tc>
+                <a:tc>
+                  <a:txBody>
+                    <a:bodyPr/>
+                    <a:lstStyle/>
+                    <a:p>
+                      <a:r>
+                        <a:rPr lang="en-US" sz="1400" dirty="0"/>
+                        <a:t>13</a:t>
+                      </a:r>
+                    </a:p>
+                  </a:txBody>
+                  <a:tcPr/>
+                </a:tc>
+                <a:tc>
+                  <a:txBody>
+                    <a:bodyPr/>
+                    <a:lstStyle/>
+                    <a:p>
+                      <a:r>
+                        <a:rPr lang="en-US" sz="1400" dirty="0"/>
+                        <a:t>14</a:t>
+                      </a:r>
+                    </a:p>
+                  </a:txBody>
+                  <a:tcPr/>
+                </a:tc>
+                <a:tc>
+                  <a:txBody>
+                    <a:bodyPr/>
+                    <a:lstStyle/>
+                    <a:p>
+                      <a:r>
+                        <a:rPr lang="en-US" sz="1400" dirty="0"/>
+                        <a:t>15</a:t>
+                      </a:r>
+                    </a:p>
+                  </a:txBody>
+                  <a:tcPr/>
+                </a:tc>
+                <a:tc>
+                  <a:txBody>
+                    <a:bodyPr/>
+                    <a:lstStyle/>
+                    <a:p>
+                      <a:r>
+                        <a:rPr lang="en-US" sz="1400" dirty="0"/>
+                        <a:t>…</a:t>
+                      </a:r>
+                    </a:p>
+                  </a:txBody>
+                  <a:tcPr/>
+                </a:tc>
+                <a:extLst>
+                  <a:ext uri="{0D108BD9-81ED-4DB2-BD59-A6C34878D82A}">
+                    <a16:rowId xmlns:a16="http://schemas.microsoft.com/office/drawing/2014/main" val="1691462546"/>
+                  </a:ext>
+                </a:extLst>
+              </a:tr>
+            </a:tbl>
+          </a:graphicData>
+        </a:graphic>
+      </p:graphicFrame>
+      <p:sp>
+        <p:nvSpPr>
+          <p:cNvPr id="9" name="TextBox 8">
+            <a:extLst>
+              <a:ext uri="{FF2B5EF4-FFF2-40B4-BE49-F238E27FC236}">
+                <a16:creationId xmlns:a16="http://schemas.microsoft.com/office/drawing/2014/main" id="{BC2C7497-5632-1BCF-D89C-0B81C73A9421}"/>
+              </a:ext>
+            </a:extLst>
+          </p:cNvPr>
+          <p:cNvSpPr txBox="1"/>
+          <p:nvPr/>
+        </p:nvSpPr>
+        <p:spPr>
+          <a:xfrm>
+            <a:off x="504934" y="1038685"/>
+            <a:ext cx="11305353" cy="830997"/>
+          </a:xfrm>
+          <a:prstGeom prst="rect">
+            <a:avLst/>
+          </a:prstGeom>
+          <a:noFill/>
+        </p:spPr>
+        <p:txBody>
+          <a:bodyPr wrap="square">
+            <a:spAutoFit/>
+          </a:bodyPr>
+          <a:lstStyle/>
+          <a:p>
+            <a:r>
+              <a:rPr lang="en-US" sz="2400" dirty="0">
+                <a:solidFill>
+                  <a:schemeClr val="accent1"/>
+                </a:solidFill>
+              </a:rPr>
+              <a:t>Because RSA is a mathematical algorithm, we must first convert the plaintext or ciphertext to an integer…</a:t>
             </a:r>
           </a:p>
         </p:txBody>
@@ -13039,7 +14105,7 @@
             </a:r>
             <a:r>
               <a:rPr lang="en-US" dirty="0"/>
-              <a:t>}. So, when we encrypt a message (m) with modular exponentiation…</a:t>
+              <a:t>}. So, when we encrypt a message (m) using RSA modular exponentiation…</a:t>
             </a:r>
           </a:p>
           <a:p>
@@ -13159,14 +14225,14 @@
                   <a:srgbClr val="0071C5"/>
                 </a:solidFill>
               </a:rPr>
-              <a:t>This is our cipher text.</a:t>
+              <a:t>This is the numerical ciphertext.</a:t>
             </a:r>
           </a:p>
           <a:p>
             <a:pPr algn="ctr"/>
             <a:r>
               <a:rPr lang="en-US" dirty="0"/>
-              <a:t>If we covert this to text, we get “</a:t>
+              <a:t>If we encode this as text, we get “</a:t>
             </a:r>
             <a:r>
               <a:rPr lang="en-US" dirty="0">
@@ -13270,7 +14336,13 @@
           <a:p>
             <a:r>
               <a:rPr lang="en-US" dirty="0"/>
-              <a:t>The associated private key is {d, n} = {1239467, 1861963}. When we decrypt cipher-text (c) with modular exponentiation…</a:t>
+              <a:t>Remember: the numerical ciphertext is 559749.</a:t>
+            </a:r>
+          </a:p>
+          <a:p>
+            <a:r>
+              <a:rPr lang="en-US" dirty="0"/>
+              <a:t>The associated private key is {d, n} = {1239467, 1861963}. When we decrypt the ciphertext (c) using modular exponentiation…</a:t>
             </a:r>
           </a:p>
           <a:p>
@@ -13575,7 +14647,7 @@
                   <a:schemeClr val="tx2"/>
                 </a:solidFill>
               </a:rPr>
-              <a:t>If you successfully decrypt the word, you’ll earn a ticket for a prize raffle we will be having at the end.</a:t>
+              <a:t>If you successfully decrypt the word, you’ll earn a ticket for a prize raffle we will conduct at the end of the activity.</a:t>
             </a:r>
           </a:p>
         </p:txBody>
@@ -13669,7 +14741,7 @@
           <a:p>
             <a:r>
               <a:rPr lang="en-US" dirty="0"/>
-              <a:t>We will be using 11 bit primes. This results in 22 bit moduli.</a:t>
+              <a:t>We will be using 11-bit primes (p=1153, q=1601). This results in a 22-bit modulus.</a:t>
             </a:r>
           </a:p>
           <a:p>
@@ -14484,7 +15556,7 @@
                   <a:schemeClr val="accent1"/>
                 </a:solidFill>
               </a:rPr>
-              <a:t>Knowledge of the cryptographic algorithm and its design does not diminish other security properties. In fact, it is expected that the attacker knows the cryptographic algorithm quite well. Security of the cryptographic algorithm rests only in the underlying hardness assumptions (e.g. the hardness of integer factorization), protection of algorithm secrets (e.g. keys) and implementation correctness.</a:t>
+              <a:t>Knowledge of the cryptographic algorithm and its design does not diminish other security properties. In fact, it is expected that the attacker knows the cryptographic algorithm quite well. Security of the cryptographic algorithm rests only in the underlying “hardness assumptions” (e.g., the difficulty of large integer factorization), protection of algorithm secrets (e.g., keys) and implementation correctness.</a:t>
             </a:r>
           </a:p>
           <a:p>
@@ -14676,14 +15748,19 @@
             <p:ph sz="quarter" idx="13"/>
           </p:nvPr>
         </p:nvSpPr>
-        <p:spPr/>
+        <p:spPr>
+          <a:xfrm>
+            <a:off x="609601" y="1238674"/>
+            <a:ext cx="10970683" cy="4567767"/>
+          </a:xfrm>
+        </p:spPr>
         <p:txBody>
           <a:bodyPr/>
           <a:lstStyle/>
           <a:p>
             <a:r>
               <a:rPr lang="en-US" dirty="0"/>
-              <a:t>Symmetric-key algorithms are algorithms for cryptography that use the same cryptographic keys for both the encryption of plaintext and the decryption of ciphertext. </a:t>
+              <a:t>Symmetric key cryptographic algorithms use the same cryptographic key for both the encryption of plaintext as well as the decryption of ciphertext. </a:t>
             </a:r>
           </a:p>
           <a:p>
@@ -14693,7 +15770,7 @@
             </a:pPr>
             <a:r>
               <a:rPr lang="en-US" dirty="0"/>
-              <a:t>The keys may be identical, or there may be a simple transformation to go between the two keys.</a:t>
+              <a:t>The encryption and decryption keys are identical and must be kept secret.</a:t>
             </a:r>
           </a:p>
           <a:p>
@@ -14703,7 +15780,78 @@
             </a:pPr>
             <a:r>
               <a:rPr lang="en-US" dirty="0"/>
-              <a:t> The keys, in practice, represent a shared secret between two or more parties that can be used to maintain a private information link</a:t>
+              <a:t>Based on the key, the algorithm performs various transformations (confusion and diffusion) on the plaintext to render the ciphertext as indistinguishable from random data.</a:t>
+            </a:r>
+          </a:p>
+          <a:p>
+            <a:pPr marL="342900" indent="-342900">
+              <a:buFont typeface="Arial" panose="020B0604020202020204" pitchFamily="34" charset="0"/>
+              <a:buChar char="•"/>
+            </a:pPr>
+            <a:r>
+              <a:rPr lang="en-US" dirty="0"/>
+              <a:t>Used to encrypt larger quantities of data.</a:t>
+            </a:r>
+          </a:p>
+          <a:p>
+            <a:pPr marL="342900" indent="-342900">
+              <a:buFont typeface="Arial" panose="020B0604020202020204" pitchFamily="34" charset="0"/>
+              <a:buChar char="•"/>
+            </a:pPr>
+            <a:r>
+              <a:rPr lang="en-US" dirty="0"/>
+              <a:t>Often used to protect stored data or to exchange data between two parties over an insecure link.</a:t>
+            </a:r>
+          </a:p>
+        </p:txBody>
+      </p:sp>
+      <p:sp>
+        <p:nvSpPr>
+          <p:cNvPr id="3" name="TextBox 2">
+            <a:extLst>
+              <a:ext uri="{FF2B5EF4-FFF2-40B4-BE49-F238E27FC236}">
+                <a16:creationId xmlns:a16="http://schemas.microsoft.com/office/drawing/2014/main" id="{F7F85D1E-704A-EA6E-02BD-FFDAE5E35A53}"/>
+              </a:ext>
+            </a:extLst>
+          </p:cNvPr>
+          <p:cNvSpPr txBox="1"/>
+          <p:nvPr/>
+        </p:nvSpPr>
+        <p:spPr>
+          <a:xfrm>
+            <a:off x="0" y="5619326"/>
+            <a:ext cx="12192000" cy="615553"/>
+          </a:xfrm>
+          <a:prstGeom prst="rect">
+            <a:avLst/>
+          </a:prstGeom>
+          <a:noFill/>
+        </p:spPr>
+        <p:txBody>
+          <a:bodyPr vert="horz" wrap="square" lIns="0" tIns="0" rIns="0" bIns="0" rtlCol="0">
+            <a:spAutoFit/>
+          </a:bodyPr>
+          <a:lstStyle/>
+          <a:p>
+            <a:pPr algn="ctr"/>
+            <a:r>
+              <a:rPr lang="en-US" sz="2000" i="1" dirty="0">
+                <a:solidFill>
+                  <a:srgbClr val="003C71"/>
+                </a:solidFill>
+              </a:rPr>
+              <a:t>Challenge: How do I manage keys for all the people </a:t>
+            </a:r>
+          </a:p>
+          <a:p>
+            <a:pPr algn="ctr"/>
+            <a:r>
+              <a:rPr lang="en-US" sz="2000" i="1" dirty="0">
+                <a:solidFill>
+                  <a:srgbClr val="003C71"/>
+                </a:solidFill>
+              </a:rPr>
+              <a:t>I want to securely share confidential data with?</a:t>
             </a:r>
           </a:p>
         </p:txBody>
@@ -15383,7 +16531,15 @@
             </a:r>
             <a:r>
               <a:rPr lang="en-US" dirty="0"/>
-              <a:t> (which may not be known by anyone except the owner).</a:t>
+              <a:t> (which </a:t>
+            </a:r>
+            <a:r>
+              <a:rPr lang="en-US" b="1" u="sng" dirty="0"/>
+              <a:t>must not</a:t>
+            </a:r>
+            <a:r>
+              <a:rPr lang="en-US" dirty="0"/>
+              <a:t> be known by anyone except the owner).</a:t>
             </a:r>
             <a:endParaRPr lang="en-US" baseline="30000" dirty="0"/>
           </a:p>
@@ -15394,7 +16550,7 @@
             </a:pPr>
             <a:r>
               <a:rPr lang="en-US" dirty="0"/>
-              <a:t>The generation of such key pairs depends on cryptographic algorithms which are based on mathematical problems termed one-way functions. </a:t>
+              <a:t>The generation of such key pairs depends on cryptographic algorithms which are based on mathematical problems termed trapdoor one-way functions. </a:t>
             </a:r>
           </a:p>
           <a:p>

</xml_diff>